<commit_message>
update powerpoint with new layout
</commit_message>
<xml_diff>
--- a/presentation/Final Presentation.pptx
+++ b/presentation/Final Presentation.pptx
@@ -5664,27 +5664,52 @@
       </p:grpSpPr>
       <p:pic>
         <p:nvPicPr>
-          <p:cNvPr id="9" name="Picture 8" descr="Screenshot_2013-05-24-23-17-44.png"/>
+          <p:cNvPr id="2" name="Picture 1"/>
           <p:cNvPicPr>
             <a:picLocks noChangeAspect="1"/>
           </p:cNvPicPr>
           <p:nvPr/>
         </p:nvPicPr>
-        <p:blipFill rotWithShape="1">
-          <a:blip r:embed="rId3">
+        <p:blipFill>
+          <a:blip r:embed="rId3"/>
+          <a:stretch>
+            <a:fillRect/>
+          </a:stretch>
+        </p:blipFill>
+        <p:spPr>
+          <a:xfrm>
+            <a:off x="4839901" y="443046"/>
+            <a:ext cx="3553460" cy="5330190"/>
+          </a:xfrm>
+          <a:prstGeom prst="rect">
+            <a:avLst/>
+          </a:prstGeom>
+        </p:spPr>
+      </p:pic>
+      <p:pic>
+        <p:nvPicPr>
+          <p:cNvPr id="5" name="Picture 4" descr="Screen Shot 2013-05-27 at 7.54.33 PM.png"/>
+          <p:cNvPicPr>
+            <a:picLocks noChangeAspect="1"/>
+          </p:cNvPicPr>
+          <p:nvPr/>
+        </p:nvPicPr>
+        <p:blipFill>
+          <a:blip r:embed="rId4">
             <a:extLst>
               <a:ext uri="{28A0092B-C50C-407E-A947-70E740481C1C}">
                 <a14:useLocalDpi xmlns:a14="http://schemas.microsoft.com/office/drawing/2010/main" val="0"/>
               </a:ext>
             </a:extLst>
           </a:blip>
-          <a:srcRect t="4307"/>
-          <a:stretch/>
+          <a:stretch>
+            <a:fillRect/>
+          </a:stretch>
         </p:blipFill>
         <p:spPr>
           <a:xfrm>
-            <a:off x="466383" y="413511"/>
-            <a:ext cx="3476206" cy="5913761"/>
+            <a:off x="567546" y="443046"/>
+            <a:ext cx="3446589" cy="5231111"/>
           </a:xfrm>
           <a:prstGeom prst="rect">
             <a:avLst/>
@@ -5699,8 +5724,8 @@
         </p:nvSpPr>
         <p:spPr>
           <a:xfrm flipV="1">
-            <a:off x="2457504" y="4814450"/>
-            <a:ext cx="2622082" cy="633002"/>
+            <a:off x="3741119" y="3889466"/>
+            <a:ext cx="1330562" cy="633002"/>
           </a:xfrm>
           <a:prstGeom prst="rightArrow">
             <a:avLst/>
@@ -5729,35 +5754,6 @@
           </a:p>
         </p:txBody>
       </p:sp>
-      <p:pic>
-        <p:nvPicPr>
-          <p:cNvPr id="4" name="Picture 3" descr="Screenshot_2013-05-24-23-20-02.png"/>
-          <p:cNvPicPr>
-            <a:picLocks noChangeAspect="1"/>
-          </p:cNvPicPr>
-          <p:nvPr/>
-        </p:nvPicPr>
-        <p:blipFill rotWithShape="1">
-          <a:blip r:embed="rId4">
-            <a:extLst>
-              <a:ext uri="{28A0092B-C50C-407E-A947-70E740481C1C}">
-                <a14:useLocalDpi xmlns:a14="http://schemas.microsoft.com/office/drawing/2010/main" val="0"/>
-              </a:ext>
-            </a:extLst>
-          </a:blip>
-          <a:srcRect t="3661"/>
-          <a:stretch/>
-        </p:blipFill>
-        <p:spPr>
-          <a:xfrm>
-            <a:off x="5071680" y="443047"/>
-            <a:ext cx="3391994" cy="5809455"/>
-          </a:xfrm>
-          <a:prstGeom prst="rect">
-            <a:avLst/>
-          </a:prstGeom>
-        </p:spPr>
-      </p:pic>
     </p:spTree>
     <p:extLst>
       <p:ext uri="{BB962C8B-B14F-4D97-AF65-F5344CB8AC3E}">
@@ -6003,13 +5999,13 @@
       </p:grpSpPr>
       <p:pic>
         <p:nvPicPr>
-          <p:cNvPr id="9" name="Picture 8" descr="Screenshot_2013-05-24-23-17-44.png"/>
+          <p:cNvPr id="7" name="Picture 6" descr="Screen Shot 2013-05-27 at 7.54.33 PM.png"/>
           <p:cNvPicPr>
             <a:picLocks noChangeAspect="1"/>
           </p:cNvPicPr>
           <p:nvPr/>
         </p:nvPicPr>
-        <p:blipFill rotWithShape="1">
+        <p:blipFill>
           <a:blip r:embed="rId3">
             <a:extLst>
               <a:ext uri="{28A0092B-C50C-407E-A947-70E740481C1C}">
@@ -6017,42 +6013,14 @@
               </a:ext>
             </a:extLst>
           </a:blip>
-          <a:srcRect t="4307"/>
-          <a:stretch/>
+          <a:stretch>
+            <a:fillRect/>
+          </a:stretch>
         </p:blipFill>
         <p:spPr>
           <a:xfrm>
-            <a:off x="126760" y="930403"/>
-            <a:ext cx="2564562" cy="4362862"/>
-          </a:xfrm>
-          <a:prstGeom prst="rect">
-            <a:avLst/>
-          </a:prstGeom>
-        </p:spPr>
-      </p:pic>
-      <p:pic>
-        <p:nvPicPr>
-          <p:cNvPr id="4" name="Picture 3" descr="Screenshot_2013-05-24-23-21-07.png"/>
-          <p:cNvPicPr>
-            <a:picLocks noChangeAspect="1"/>
-          </p:cNvPicPr>
-          <p:nvPr/>
-        </p:nvPicPr>
-        <p:blipFill rotWithShape="1">
-          <a:blip r:embed="rId4">
-            <a:extLst>
-              <a:ext uri="{28A0092B-C50C-407E-A947-70E740481C1C}">
-                <a14:useLocalDpi xmlns:a14="http://schemas.microsoft.com/office/drawing/2010/main" val="0"/>
-              </a:ext>
-            </a:extLst>
-          </a:blip>
-          <a:srcRect t="4091"/>
-          <a:stretch/>
-        </p:blipFill>
-        <p:spPr>
-          <a:xfrm>
-            <a:off x="3305984" y="930404"/>
-            <a:ext cx="2558804" cy="4362862"/>
+            <a:off x="0" y="941248"/>
+            <a:ext cx="3202407" cy="4153070"/>
           </a:xfrm>
           <a:prstGeom prst="rect">
             <a:avLst/>
@@ -6068,7 +6036,7 @@
           <p:nvPr/>
         </p:nvPicPr>
         <p:blipFill rotWithShape="1">
-          <a:blip r:embed="rId5">
+          <a:blip r:embed="rId4">
             <a:extLst>
               <a:ext uri="{28A0092B-C50C-407E-A947-70E740481C1C}">
                 <a14:useLocalDpi xmlns:a14="http://schemas.microsoft.com/office/drawing/2010/main" val="0"/>
@@ -6164,6 +6132,30 @@
           </a:p>
         </p:txBody>
       </p:sp>
+      <p:pic>
+        <p:nvPicPr>
+          <p:cNvPr id="2" name="Picture 1"/>
+          <p:cNvPicPr>
+            <a:picLocks noChangeAspect="1"/>
+          </p:cNvPicPr>
+          <p:nvPr/>
+        </p:nvPicPr>
+        <p:blipFill>
+          <a:blip r:embed="rId5"/>
+          <a:stretch>
+            <a:fillRect/>
+          </a:stretch>
+        </p:blipFill>
+        <p:spPr>
+          <a:xfrm>
+            <a:off x="3066777" y="957513"/>
+            <a:ext cx="3273807" cy="4136806"/>
+          </a:xfrm>
+          <a:prstGeom prst="rect">
+            <a:avLst/>
+          </a:prstGeom>
+        </p:spPr>
+      </p:pic>
     </p:spTree>
     <p:extLst>
       <p:ext uri="{BB962C8B-B14F-4D97-AF65-F5344CB8AC3E}">
@@ -9536,13 +9528,13 @@
       </p:grpSpPr>
       <p:pic>
         <p:nvPicPr>
-          <p:cNvPr id="2" name="Picture 1" descr="Screenshot_2013-05-24-23-17-44.png"/>
+          <p:cNvPr id="3" name="Picture 2" descr="Screen Shot 2013-05-27 at 7.54.33 PM.png"/>
           <p:cNvPicPr>
             <a:picLocks noChangeAspect="1"/>
           </p:cNvPicPr>
           <p:nvPr/>
         </p:nvPicPr>
-        <p:blipFill rotWithShape="1">
+        <p:blipFill>
           <a:blip r:embed="rId4">
             <a:extLst>
               <a:ext uri="{28A0092B-C50C-407E-A947-70E740481C1C}">
@@ -9550,13 +9542,14 @@
               </a:ext>
             </a:extLst>
           </a:blip>
-          <a:srcRect t="4307"/>
-          <a:stretch/>
+          <a:stretch>
+            <a:fillRect/>
+          </a:stretch>
         </p:blipFill>
         <p:spPr>
           <a:xfrm>
-            <a:off x="2961881" y="516889"/>
-            <a:ext cx="3343308" cy="5687673"/>
+            <a:off x="2073669" y="469396"/>
+            <a:ext cx="4276570" cy="5881244"/>
           </a:xfrm>
           <a:prstGeom prst="rect">
             <a:avLst/>
@@ -9611,13 +9604,13 @@
       </p:grpSpPr>
       <p:pic>
         <p:nvPicPr>
-          <p:cNvPr id="5" name="Picture 4" descr="Screenshot_2013-05-24-23-17-44.png"/>
+          <p:cNvPr id="6" name="Picture 5" descr="Screen Shot 2013-05-27 at 7.54.33 PM.png"/>
           <p:cNvPicPr>
             <a:picLocks noChangeAspect="1"/>
           </p:cNvPicPr>
           <p:nvPr/>
         </p:nvPicPr>
-        <p:blipFill rotWithShape="1">
+        <p:blipFill>
           <a:blip r:embed="rId4">
             <a:extLst>
               <a:ext uri="{28A0092B-C50C-407E-A947-70E740481C1C}">
@@ -9625,13 +9618,14 @@
               </a:ext>
             </a:extLst>
           </a:blip>
-          <a:srcRect t="4307"/>
-          <a:stretch/>
+          <a:stretch>
+            <a:fillRect/>
+          </a:stretch>
         </p:blipFill>
         <p:spPr>
           <a:xfrm>
-            <a:off x="274423" y="506450"/>
-            <a:ext cx="3343308" cy="5687673"/>
+            <a:off x="0" y="409811"/>
+            <a:ext cx="4276570" cy="5881244"/>
           </a:xfrm>
           <a:prstGeom prst="rect">
             <a:avLst/>
@@ -9675,7 +9669,7 @@
         </p:nvSpPr>
         <p:spPr>
           <a:xfrm flipV="1">
-            <a:off x="1712339" y="2364952"/>
+            <a:off x="1462579" y="2289094"/>
             <a:ext cx="4135640" cy="417578"/>
           </a:xfrm>
           <a:prstGeom prst="rightArrow">
@@ -9747,13 +9741,13 @@
       </p:grpSpPr>
       <p:pic>
         <p:nvPicPr>
-          <p:cNvPr id="5" name="Picture 4" descr="Screenshot_2013-05-24-23-17-44.png"/>
+          <p:cNvPr id="7" name="Picture 6" descr="Screen Shot 2013-05-27 at 7.54.33 PM.png"/>
           <p:cNvPicPr>
             <a:picLocks noChangeAspect="1"/>
           </p:cNvPicPr>
           <p:nvPr/>
         </p:nvPicPr>
-        <p:blipFill rotWithShape="1">
+        <p:blipFill>
           <a:blip r:embed="rId3">
             <a:extLst>
               <a:ext uri="{28A0092B-C50C-407E-A947-70E740481C1C}">
@@ -9761,13 +9755,14 @@
               </a:ext>
             </a:extLst>
           </a:blip>
-          <a:srcRect t="4307"/>
-          <a:stretch/>
+          <a:stretch>
+            <a:fillRect/>
+          </a:stretch>
         </p:blipFill>
         <p:spPr>
           <a:xfrm>
-            <a:off x="126760" y="797491"/>
-            <a:ext cx="2564562" cy="4362862"/>
+            <a:off x="0" y="797491"/>
+            <a:ext cx="2953793" cy="4062129"/>
           </a:xfrm>
           <a:prstGeom prst="rect">
             <a:avLst/>
@@ -10194,13 +10189,13 @@
       </p:grpSpPr>
       <p:pic>
         <p:nvPicPr>
-          <p:cNvPr id="2" name="Picture 1" descr="Screenshot_2013-05-24-23-18-56.png"/>
+          <p:cNvPr id="7" name="Picture 6" descr="Screen Shot 2013-05-27 at 7.54.33 PM.png"/>
           <p:cNvPicPr>
             <a:picLocks noChangeAspect="1"/>
           </p:cNvPicPr>
           <p:nvPr/>
         </p:nvPicPr>
-        <p:blipFill rotWithShape="1">
+        <p:blipFill>
           <a:blip r:embed="rId4">
             <a:extLst>
               <a:ext uri="{28A0092B-C50C-407E-A947-70E740481C1C}">
@@ -10208,13 +10203,14 @@
               </a:ext>
             </a:extLst>
           </a:blip>
-          <a:srcRect t="4091"/>
-          <a:stretch/>
+          <a:stretch>
+            <a:fillRect/>
+          </a:stretch>
         </p:blipFill>
         <p:spPr>
           <a:xfrm>
-            <a:off x="3176020" y="932432"/>
-            <a:ext cx="2619027" cy="4465545"/>
+            <a:off x="29157" y="932432"/>
+            <a:ext cx="2941984" cy="4465240"/>
           </a:xfrm>
           <a:prstGeom prst="rect">
             <a:avLst/>
@@ -10223,7 +10219,7 @@
       </p:pic>
       <p:pic>
         <p:nvPicPr>
-          <p:cNvPr id="9" name="Picture 8" descr="Screenshot_2013-05-24-23-17-44.png"/>
+          <p:cNvPr id="2" name="Picture 1" descr="Screenshot_2013-05-24-23-18-56.png"/>
           <p:cNvPicPr>
             <a:picLocks noChangeAspect="1"/>
           </p:cNvPicPr>
@@ -10237,13 +10233,13 @@
               </a:ext>
             </a:extLst>
           </a:blip>
-          <a:srcRect t="4307"/>
+          <a:srcRect t="4091"/>
           <a:stretch/>
         </p:blipFill>
         <p:spPr>
           <a:xfrm>
-            <a:off x="126760" y="930403"/>
-            <a:ext cx="2564562" cy="4362862"/>
+            <a:off x="3176020" y="932432"/>
+            <a:ext cx="2619027" cy="4465545"/>
           </a:xfrm>
           <a:prstGeom prst="rect">
             <a:avLst/>
@@ -10258,8 +10254,8 @@
         </p:nvSpPr>
         <p:spPr>
           <a:xfrm flipV="1">
-            <a:off x="1298882" y="2896612"/>
-            <a:ext cx="2156418" cy="633002"/>
+            <a:off x="1302416" y="3752568"/>
+            <a:ext cx="2411093" cy="500854"/>
           </a:xfrm>
           <a:prstGeom prst="rightArrow">
             <a:avLst/>

</xml_diff>

<commit_message>
updated presentation to reflect new changes to ballard exam
</commit_message>
<xml_diff>
--- a/presentation/Final Presentation.pptx
+++ b/presentation/Final Presentation.pptx
@@ -6019,8 +6019,8 @@
         </p:blipFill>
         <p:spPr>
           <a:xfrm>
-            <a:off x="0" y="941248"/>
-            <a:ext cx="3202407" cy="4153070"/>
+            <a:off x="1" y="941249"/>
+            <a:ext cx="3036896" cy="3938426"/>
           </a:xfrm>
           <a:prstGeom prst="rect">
             <a:avLst/>
@@ -6048,24 +6048,48 @@
         </p:blipFill>
         <p:spPr>
           <a:xfrm>
-            <a:off x="6295156" y="941247"/>
-            <a:ext cx="2572652" cy="4396322"/>
+            <a:off x="6349806" y="941247"/>
+            <a:ext cx="2518002" cy="4302933"/>
           </a:xfrm>
           <a:prstGeom prst="rect">
             <a:avLst/>
           </a:prstGeom>
         </p:spPr>
       </p:pic>
-      <p:sp>
-        <p:nvSpPr>
-          <p:cNvPr id="11" name="Right Arrow 10"/>
+      <p:pic>
+        <p:nvPicPr>
+          <p:cNvPr id="2" name="Picture 1"/>
+          <p:cNvPicPr>
+            <a:picLocks noChangeAspect="1"/>
+          </p:cNvPicPr>
+          <p:nvPr/>
+        </p:nvPicPr>
+        <p:blipFill>
+          <a:blip r:embed="rId5"/>
+          <a:stretch>
+            <a:fillRect/>
+          </a:stretch>
+        </p:blipFill>
+        <p:spPr>
+          <a:xfrm>
+            <a:off x="3178342" y="941247"/>
+            <a:ext cx="3116814" cy="3938428"/>
+          </a:xfrm>
+          <a:prstGeom prst="rect">
+            <a:avLst/>
+          </a:prstGeom>
+        </p:spPr>
+      </p:pic>
+      <p:sp>
+        <p:nvSpPr>
+          <p:cNvPr id="10" name="Right Arrow 9"/>
           <p:cNvSpPr/>
           <p:nvPr/>
         </p:nvSpPr>
         <p:spPr>
           <a:xfrm flipV="1">
-            <a:off x="4459407" y="4048532"/>
-            <a:ext cx="1963912" cy="633002"/>
+            <a:off x="2495496" y="2322680"/>
+            <a:ext cx="682846" cy="633002"/>
           </a:xfrm>
           <a:prstGeom prst="rightArrow">
             <a:avLst/>
@@ -6096,14 +6120,14 @@
       </p:sp>
       <p:sp>
         <p:nvSpPr>
-          <p:cNvPr id="10" name="Right Arrow 9"/>
+          <p:cNvPr id="11" name="Right Arrow 10"/>
           <p:cNvSpPr/>
           <p:nvPr/>
         </p:nvSpPr>
         <p:spPr>
           <a:xfrm flipV="1">
-            <a:off x="2495496" y="2322680"/>
-            <a:ext cx="1018872" cy="633002"/>
+            <a:off x="5223734" y="3415530"/>
+            <a:ext cx="1126072" cy="633002"/>
           </a:xfrm>
           <a:prstGeom prst="rightArrow">
             <a:avLst/>
@@ -6132,30 +6156,6 @@
           </a:p>
         </p:txBody>
       </p:sp>
-      <p:pic>
-        <p:nvPicPr>
-          <p:cNvPr id="2" name="Picture 1"/>
-          <p:cNvPicPr>
-            <a:picLocks noChangeAspect="1"/>
-          </p:cNvPicPr>
-          <p:nvPr/>
-        </p:nvPicPr>
-        <p:blipFill>
-          <a:blip r:embed="rId5"/>
-          <a:stretch>
-            <a:fillRect/>
-          </a:stretch>
-        </p:blipFill>
-        <p:spPr>
-          <a:xfrm>
-            <a:off x="3066777" y="957513"/>
-            <a:ext cx="3273807" cy="4136806"/>
-          </a:xfrm>
-          <a:prstGeom prst="rect">
-            <a:avLst/>
-          </a:prstGeom>
-        </p:spPr>
-      </p:pic>
     </p:spTree>
     <p:extLst>
       <p:ext uri="{BB962C8B-B14F-4D97-AF65-F5344CB8AC3E}">
@@ -6227,7 +6227,7 @@
       </p:pic>
       <p:pic>
         <p:nvPicPr>
-          <p:cNvPr id="2" name="Picture 1" descr="Screenshot_2013-05-24-23-21-30.png"/>
+          <p:cNvPr id="3" name="Picture 2" descr="Screenshot_2013-05-24-23-21-50.png"/>
           <p:cNvPicPr>
             <a:picLocks noChangeAspect="1"/>
           </p:cNvPicPr>
@@ -6241,35 +6241,6 @@
               </a:ext>
             </a:extLst>
           </a:blip>
-          <a:srcRect t="3445"/>
-          <a:stretch/>
-        </p:blipFill>
-        <p:spPr>
-          <a:xfrm>
-            <a:off x="3095868" y="977436"/>
-            <a:ext cx="2549883" cy="4376936"/>
-          </a:xfrm>
-          <a:prstGeom prst="rect">
-            <a:avLst/>
-          </a:prstGeom>
-        </p:spPr>
-      </p:pic>
-      <p:pic>
-        <p:nvPicPr>
-          <p:cNvPr id="3" name="Picture 2" descr="Screenshot_2013-05-24-23-21-50.png"/>
-          <p:cNvPicPr>
-            <a:picLocks noChangeAspect="1"/>
-          </p:cNvPicPr>
-          <p:nvPr/>
-        </p:nvPicPr>
-        <p:blipFill rotWithShape="1">
-          <a:blip r:embed="rId5">
-            <a:extLst>
-              <a:ext uri="{28A0092B-C50C-407E-A947-70E740481C1C}">
-                <a14:useLocalDpi xmlns:a14="http://schemas.microsoft.com/office/drawing/2010/main" val="0"/>
-              </a:ext>
-            </a:extLst>
-          </a:blip>
           <a:srcRect t="3876"/>
           <a:stretch/>
         </p:blipFill>
@@ -6285,14 +6256,14 @@
       </p:pic>
       <p:sp>
         <p:nvSpPr>
-          <p:cNvPr id="10" name="Right Arrow 9"/>
+          <p:cNvPr id="11" name="Right Arrow 10"/>
           <p:cNvSpPr/>
           <p:nvPr/>
         </p:nvSpPr>
         <p:spPr>
           <a:xfrm flipV="1">
-            <a:off x="1048405" y="2381752"/>
-            <a:ext cx="2155877" cy="633002"/>
+            <a:off x="4997205" y="2512637"/>
+            <a:ext cx="1411347" cy="633002"/>
           </a:xfrm>
           <a:prstGeom prst="rightArrow">
             <a:avLst/>
@@ -6321,16 +6292,46 @@
           </a:p>
         </p:txBody>
       </p:sp>
-      <p:sp>
-        <p:nvSpPr>
-          <p:cNvPr id="11" name="Right Arrow 10"/>
+      <p:pic>
+        <p:nvPicPr>
+          <p:cNvPr id="4" name="Picture 3" descr="Screen Shot 2013-05-29 at 1.08.10 PM.png"/>
+          <p:cNvPicPr>
+            <a:picLocks noChangeAspect="1"/>
+          </p:cNvPicPr>
+          <p:nvPr/>
+        </p:nvPicPr>
+        <p:blipFill>
+          <a:blip r:embed="rId5">
+            <a:extLst>
+              <a:ext uri="{28A0092B-C50C-407E-A947-70E740481C1C}">
+                <a14:useLocalDpi xmlns:a14="http://schemas.microsoft.com/office/drawing/2010/main" val="0"/>
+              </a:ext>
+            </a:extLst>
+          </a:blip>
+          <a:stretch>
+            <a:fillRect/>
+          </a:stretch>
+        </p:blipFill>
+        <p:spPr>
+          <a:xfrm>
+            <a:off x="3095868" y="977436"/>
+            <a:ext cx="2516334" cy="3566408"/>
+          </a:xfrm>
+          <a:prstGeom prst="rect">
+            <a:avLst/>
+          </a:prstGeom>
+        </p:spPr>
+      </p:pic>
+      <p:sp>
+        <p:nvSpPr>
+          <p:cNvPr id="10" name="Right Arrow 9"/>
           <p:cNvSpPr/>
           <p:nvPr/>
         </p:nvSpPr>
         <p:spPr>
           <a:xfrm flipV="1">
-            <a:off x="4997205" y="2512637"/>
-            <a:ext cx="1411347" cy="633002"/>
+            <a:off x="1191671" y="2381752"/>
+            <a:ext cx="2155877" cy="633002"/>
           </a:xfrm>
           <a:prstGeom prst="rightArrow">
             <a:avLst/>
@@ -6399,53 +6400,15 @@
           <a:chExt cx="0" cy="0"/>
         </a:xfrm>
       </p:grpSpPr>
-      <p:sp>
-        <p:nvSpPr>
-          <p:cNvPr id="10" name="Right Arrow 9"/>
-          <p:cNvSpPr/>
-          <p:nvPr/>
-        </p:nvSpPr>
-        <p:spPr>
-          <a:xfrm flipV="1">
-            <a:off x="3765394" y="3145639"/>
-            <a:ext cx="1632767" cy="886090"/>
-          </a:xfrm>
-          <a:prstGeom prst="rightArrow">
-            <a:avLst/>
-          </a:prstGeom>
-        </p:spPr>
-        <p:style>
-          <a:lnRef idx="1">
-            <a:schemeClr val="accent1"/>
-          </a:lnRef>
-          <a:fillRef idx="3">
-            <a:schemeClr val="accent1"/>
-          </a:fillRef>
-          <a:effectRef idx="2">
-            <a:schemeClr val="accent1"/>
-          </a:effectRef>
-          <a:fontRef idx="minor">
-            <a:schemeClr val="lt1"/>
-          </a:fontRef>
-        </p:style>
-        <p:txBody>
-          <a:bodyPr rtlCol="0" anchor="ctr"/>
-          <a:lstStyle/>
-          <a:p>
-            <a:pPr algn="ctr"/>
-            <a:endParaRPr lang="en-US"/>
-          </a:p>
-        </p:txBody>
-      </p:sp>
       <p:pic>
         <p:nvPicPr>
-          <p:cNvPr id="4" name="Picture 3" descr="Screenshot_2013-05-24-23-21-54.png"/>
+          <p:cNvPr id="2" name="Picture 1" descr="Screen Shot 2013-05-29 at 1.11.10 PM.png"/>
           <p:cNvPicPr>
             <a:picLocks noChangeAspect="1"/>
           </p:cNvPicPr>
           <p:nvPr/>
         </p:nvPicPr>
-        <p:blipFill rotWithShape="1">
+        <p:blipFill>
           <a:blip r:embed="rId3">
             <a:extLst>
               <a:ext uri="{28A0092B-C50C-407E-A947-70E740481C1C}">
@@ -6453,13 +6416,14 @@
               </a:ext>
             </a:extLst>
           </a:blip>
-          <a:srcRect t="3661"/>
-          <a:stretch/>
+          <a:stretch>
+            <a:fillRect/>
+          </a:stretch>
         </p:blipFill>
         <p:spPr>
           <a:xfrm>
-            <a:off x="531588" y="531657"/>
-            <a:ext cx="2930563" cy="5390406"/>
+            <a:off x="4976437" y="188132"/>
+            <a:ext cx="3651100" cy="5823274"/>
           </a:xfrm>
           <a:prstGeom prst="rect">
             <a:avLst/>
@@ -6468,13 +6432,13 @@
       </p:pic>
       <p:pic>
         <p:nvPicPr>
-          <p:cNvPr id="6" name="Picture 5" descr="Screenshot_2013-05-24-23-21-58.png"/>
+          <p:cNvPr id="3" name="Picture 2" descr="Screen Shot 2013-05-29 at 1.12.02 PM.png"/>
           <p:cNvPicPr>
             <a:picLocks noChangeAspect="1"/>
           </p:cNvPicPr>
           <p:nvPr/>
         </p:nvPicPr>
-        <p:blipFill rotWithShape="1">
+        <p:blipFill>
           <a:blip r:embed="rId4">
             <a:extLst>
               <a:ext uri="{28A0092B-C50C-407E-A947-70E740481C1C}">
@@ -6482,13 +6446,14 @@
               </a:ext>
             </a:extLst>
           </a:blip>
-          <a:srcRect t="3661"/>
-          <a:stretch/>
+          <a:stretch>
+            <a:fillRect/>
+          </a:stretch>
         </p:blipFill>
         <p:spPr>
           <a:xfrm>
-            <a:off x="5384691" y="531657"/>
-            <a:ext cx="3147321" cy="5390406"/>
+            <a:off x="392355" y="188131"/>
+            <a:ext cx="3723253" cy="5994909"/>
           </a:xfrm>
           <a:prstGeom prst="rect">
             <a:avLst/>
@@ -6497,66 +6462,18 @@
       </p:pic>
       <p:sp>
         <p:nvSpPr>
-          <p:cNvPr id="9" name="Process 8"/>
+          <p:cNvPr id="11" name="Right Arrow 10"/>
           <p:cNvSpPr/>
           <p:nvPr/>
         </p:nvSpPr>
         <p:spPr>
-          <a:xfrm>
-            <a:off x="3428627" y="754055"/>
-            <a:ext cx="216987" cy="4398359"/>
-          </a:xfrm>
-          <a:prstGeom prst="flowChartProcess">
-            <a:avLst/>
-          </a:prstGeom>
-          <a:solidFill>
-            <a:schemeClr val="tx2">
-              <a:lumMod val="90000"/>
-            </a:schemeClr>
-          </a:solidFill>
-          <a:ln/>
-        </p:spPr>
-        <p:style>
-          <a:lnRef idx="1">
-            <a:schemeClr val="accent1"/>
-          </a:lnRef>
-          <a:fillRef idx="3">
-            <a:schemeClr val="accent1"/>
-          </a:fillRef>
-          <a:effectRef idx="2">
-            <a:schemeClr val="accent1"/>
-          </a:effectRef>
-          <a:fontRef idx="minor">
-            <a:schemeClr val="lt1"/>
-          </a:fontRef>
-        </p:style>
-        <p:txBody>
-          <a:bodyPr/>
-          <a:lstStyle/>
-          <a:p>
-            <a:endParaRPr lang="en-US"/>
-          </a:p>
-        </p:txBody>
-      </p:sp>
-      <p:sp>
-        <p:nvSpPr>
-          <p:cNvPr id="12" name="Right Arrow 11"/>
-          <p:cNvSpPr/>
-          <p:nvPr/>
-        </p:nvSpPr>
-        <p:spPr>
-          <a:xfrm rot="5400000" flipV="1">
-            <a:off x="2445968" y="2473104"/>
-            <a:ext cx="2183081" cy="186677"/>
+          <a:xfrm flipV="1">
+            <a:off x="4047166" y="1161279"/>
+            <a:ext cx="929271" cy="558822"/>
           </a:xfrm>
           <a:prstGeom prst="rightArrow">
             <a:avLst/>
           </a:prstGeom>
-          <a:solidFill>
-            <a:schemeClr val="accent3">
-              <a:lumMod val="75000"/>
-            </a:schemeClr>
-          </a:solidFill>
         </p:spPr>
         <p:style>
           <a:lnRef idx="1">

</xml_diff>